<commit_message>
correction of the Lecture#3
</commit_message>
<xml_diff>
--- a/Lectures/Lecture#3-Git.pptx
+++ b/Lectures/Lecture#3-Git.pptx
@@ -359,7 +359,7 @@
           <a:p>
             <a:fld id="{69F46399-801B-4685-98F1-1A09A0472948}" type="datetimeFigureOut">
               <a:rPr lang="uk-UA" smtClean="0"/>
-              <a:t>09.09.2024</a:t>
+              <a:t>11.09.2024</a:t>
             </a:fld>
             <a:endParaRPr lang="uk-UA"/>
           </a:p>
@@ -693,7 +693,7 @@
           <a:p>
             <a:fld id="{69F46399-801B-4685-98F1-1A09A0472948}" type="datetimeFigureOut">
               <a:rPr lang="uk-UA" smtClean="0"/>
-              <a:t>09.09.2024</a:t>
+              <a:t>11.09.2024</a:t>
             </a:fld>
             <a:endParaRPr lang="uk-UA"/>
           </a:p>
@@ -971,7 +971,7 @@
           <a:p>
             <a:fld id="{69F46399-801B-4685-98F1-1A09A0472948}" type="datetimeFigureOut">
               <a:rPr lang="uk-UA" smtClean="0"/>
-              <a:t>09.09.2024</a:t>
+              <a:t>11.09.2024</a:t>
             </a:fld>
             <a:endParaRPr lang="uk-UA"/>
           </a:p>
@@ -1539,7 +1539,7 @@
           <a:p>
             <a:fld id="{69F46399-801B-4685-98F1-1A09A0472948}" type="datetimeFigureOut">
               <a:rPr lang="uk-UA" smtClean="0"/>
-              <a:t>09.09.2024</a:t>
+              <a:t>11.09.2024</a:t>
             </a:fld>
             <a:endParaRPr lang="uk-UA"/>
           </a:p>
@@ -1817,7 +1817,7 @@
           <a:p>
             <a:fld id="{69F46399-801B-4685-98F1-1A09A0472948}" type="datetimeFigureOut">
               <a:rPr lang="uk-UA" smtClean="0"/>
-              <a:t>09.09.2024</a:t>
+              <a:t>11.09.2024</a:t>
             </a:fld>
             <a:endParaRPr lang="uk-UA"/>
           </a:p>
@@ -2379,7 +2379,7 @@
           <a:p>
             <a:fld id="{69F46399-801B-4685-98F1-1A09A0472948}" type="datetimeFigureOut">
               <a:rPr lang="uk-UA" smtClean="0"/>
-              <a:t>09.09.2024</a:t>
+              <a:t>11.09.2024</a:t>
             </a:fld>
             <a:endParaRPr lang="uk-UA"/>
           </a:p>
@@ -2706,7 +2706,7 @@
           <a:p>
             <a:fld id="{69F46399-801B-4685-98F1-1A09A0472948}" type="datetimeFigureOut">
               <a:rPr lang="uk-UA" smtClean="0"/>
-              <a:t>09.09.2024</a:t>
+              <a:t>11.09.2024</a:t>
             </a:fld>
             <a:endParaRPr lang="uk-UA"/>
           </a:p>
@@ -2883,7 +2883,7 @@
           <a:p>
             <a:fld id="{69F46399-801B-4685-98F1-1A09A0472948}" type="datetimeFigureOut">
               <a:rPr lang="uk-UA" smtClean="0"/>
-              <a:t>09.09.2024</a:t>
+              <a:t>11.09.2024</a:t>
             </a:fld>
             <a:endParaRPr lang="uk-UA"/>
           </a:p>
@@ -3121,7 +3121,7 @@
           <a:p>
             <a:fld id="{69F46399-801B-4685-98F1-1A09A0472948}" type="datetimeFigureOut">
               <a:rPr lang="uk-UA" smtClean="0"/>
-              <a:t>09.09.2024</a:t>
+              <a:t>11.09.2024</a:t>
             </a:fld>
             <a:endParaRPr lang="uk-UA"/>
           </a:p>
@@ -3321,7 +3321,7 @@
           <a:p>
             <a:fld id="{69F46399-801B-4685-98F1-1A09A0472948}" type="datetimeFigureOut">
               <a:rPr lang="uk-UA" smtClean="0"/>
-              <a:t>09.09.2024</a:t>
+              <a:t>11.09.2024</a:t>
             </a:fld>
             <a:endParaRPr lang="uk-UA"/>
           </a:p>
@@ -3597,7 +3597,7 @@
           <a:p>
             <a:fld id="{69F46399-801B-4685-98F1-1A09A0472948}" type="datetimeFigureOut">
               <a:rPr lang="uk-UA" smtClean="0"/>
-              <a:t>09.09.2024</a:t>
+              <a:t>11.09.2024</a:t>
             </a:fld>
             <a:endParaRPr lang="uk-UA"/>
           </a:p>
@@ -3863,7 +3863,7 @@
           <a:p>
             <a:fld id="{69F46399-801B-4685-98F1-1A09A0472948}" type="datetimeFigureOut">
               <a:rPr lang="uk-UA" smtClean="0"/>
-              <a:t>09.09.2024</a:t>
+              <a:t>11.09.2024</a:t>
             </a:fld>
             <a:endParaRPr lang="uk-UA"/>
           </a:p>
@@ -4237,7 +4237,7 @@
           <a:p>
             <a:fld id="{69F46399-801B-4685-98F1-1A09A0472948}" type="datetimeFigureOut">
               <a:rPr lang="uk-UA" smtClean="0"/>
-              <a:t>09.09.2024</a:t>
+              <a:t>11.09.2024</a:t>
             </a:fld>
             <a:endParaRPr lang="uk-UA"/>
           </a:p>
@@ -4385,7 +4385,7 @@
           <a:p>
             <a:fld id="{69F46399-801B-4685-98F1-1A09A0472948}" type="datetimeFigureOut">
               <a:rPr lang="uk-UA" smtClean="0"/>
-              <a:t>09.09.2024</a:t>
+              <a:t>11.09.2024</a:t>
             </a:fld>
             <a:endParaRPr lang="uk-UA"/>
           </a:p>
@@ -4510,7 +4510,7 @@
           <a:p>
             <a:fld id="{69F46399-801B-4685-98F1-1A09A0472948}" type="datetimeFigureOut">
               <a:rPr lang="uk-UA" smtClean="0"/>
-              <a:t>09.09.2024</a:t>
+              <a:t>11.09.2024</a:t>
             </a:fld>
             <a:endParaRPr lang="uk-UA"/>
           </a:p>
@@ -4795,7 +4795,7 @@
           <a:p>
             <a:fld id="{69F46399-801B-4685-98F1-1A09A0472948}" type="datetimeFigureOut">
               <a:rPr lang="uk-UA" smtClean="0"/>
-              <a:t>09.09.2024</a:t>
+              <a:t>11.09.2024</a:t>
             </a:fld>
             <a:endParaRPr lang="uk-UA"/>
           </a:p>
@@ -5119,7 +5119,7 @@
           <a:p>
             <a:fld id="{69F46399-801B-4685-98F1-1A09A0472948}" type="datetimeFigureOut">
               <a:rPr lang="uk-UA" smtClean="0"/>
-              <a:t>09.09.2024</a:t>
+              <a:t>11.09.2024</a:t>
             </a:fld>
             <a:endParaRPr lang="uk-UA"/>
           </a:p>
@@ -5336,7 +5336,7 @@
           <a:p>
             <a:fld id="{69F46399-801B-4685-98F1-1A09A0472948}" type="datetimeFigureOut">
               <a:rPr lang="uk-UA" smtClean="0"/>
-              <a:t>09.09.2024</a:t>
+              <a:t>11.09.2024</a:t>
             </a:fld>
             <a:endParaRPr lang="uk-UA"/>
           </a:p>
@@ -10307,7 +10307,7 @@
         <p:spPr/>
         <p:txBody>
           <a:bodyPr>
-            <a:normAutofit/>
+            <a:normAutofit fontScale="92500"/>
           </a:bodyPr>
           <a:lstStyle/>
           <a:p>
@@ -10317,7 +10317,7 @@
               <a:buAutoNum type="arabicPeriod"/>
             </a:pPr>
             <a:r>
-              <a:rPr lang="en-US" sz="2800" b="1" dirty="0">
+              <a:rPr lang="en-US" sz="2600" b="1" dirty="0">
                 <a:solidFill>
                   <a:schemeClr val="bg1"/>
                 </a:solidFill>
@@ -10325,7 +10325,7 @@
               <a:t> Git Book </a:t>
             </a:r>
             <a:r>
-              <a:rPr lang="en-US" sz="2800" dirty="0">
+              <a:rPr lang="en-US" sz="2600" dirty="0">
                 <a:hlinkClick r:id="rId2">
                   <a:extLst>
                     <a:ext uri="{A12FA001-AC4F-418D-AE19-62706E023703}">
@@ -10336,7 +10336,7 @@
               </a:rPr>
               <a:t>https://git-scm.com/book/en/v2</a:t>
             </a:r>
-            <a:endParaRPr lang="en-US" sz="2800" dirty="0"/>
+            <a:endParaRPr lang="en-US" sz="2600" dirty="0"/>
           </a:p>
           <a:p>
             <a:pPr marL="342900" indent="-342900">
@@ -10345,7 +10345,7 @@
               <a:buAutoNum type="arabicPeriod"/>
             </a:pPr>
             <a:r>
-              <a:rPr lang="en-US" sz="2800" b="1" dirty="0">
+              <a:rPr lang="en-US" sz="2600" b="1" dirty="0">
                 <a:solidFill>
                   <a:schemeClr val="bg1"/>
                 </a:solidFill>
@@ -10353,7 +10353,7 @@
               <a:t> </a:t>
             </a:r>
             <a:r>
-              <a:rPr lang="en-US" sz="2800" b="1" dirty="0" err="1">
+              <a:rPr lang="en-US" sz="2600" b="1" dirty="0" err="1">
                 <a:solidFill>
                   <a:schemeClr val="bg1"/>
                 </a:solidFill>
@@ -10361,7 +10361,7 @@
               <a:t>GitHowTo</a:t>
             </a:r>
             <a:r>
-              <a:rPr lang="en-US" sz="2800" b="1" dirty="0">
+              <a:rPr lang="en-US" sz="2600" b="1" dirty="0">
                 <a:solidFill>
                   <a:schemeClr val="bg1"/>
                 </a:solidFill>
@@ -10369,7 +10369,7 @@
               <a:t>  </a:t>
             </a:r>
             <a:r>
-              <a:rPr lang="en-US" sz="2800" dirty="0">
+              <a:rPr lang="en-US" sz="2600" dirty="0">
                 <a:hlinkClick r:id="rId3">
                   <a:extLst>
                     <a:ext uri="{A12FA001-AC4F-418D-AE19-62706E023703}">
@@ -10380,7 +10380,7 @@
               </a:rPr>
               <a:t>https://githowto.com/</a:t>
             </a:r>
-            <a:endParaRPr lang="en-US" sz="2800" dirty="0"/>
+            <a:endParaRPr lang="en-US" sz="2600" dirty="0"/>
           </a:p>
           <a:p>
             <a:pPr marL="342900" indent="-342900">
@@ -10389,7 +10389,7 @@
               <a:buAutoNum type="arabicPeriod"/>
             </a:pPr>
             <a:r>
-              <a:rPr lang="ru-RU" sz="2800" b="1" dirty="0" err="1">
+              <a:rPr lang="ru-RU" sz="2600" b="1" dirty="0" err="1">
                 <a:solidFill>
                   <a:schemeClr val="bg1"/>
                 </a:solidFill>
@@ -10397,7 +10397,7 @@
               <a:t>Основи</a:t>
             </a:r>
             <a:r>
-              <a:rPr lang="ru-RU" sz="2800" b="1" dirty="0">
+              <a:rPr lang="ru-RU" sz="2600" b="1" dirty="0">
                 <a:solidFill>
                   <a:schemeClr val="bg1"/>
                 </a:solidFill>
@@ -10405,7 +10405,7 @@
               <a:t> </a:t>
             </a:r>
             <a:r>
-              <a:rPr lang="ru-RU" sz="2800" b="1" dirty="0" err="1">
+              <a:rPr lang="ru-RU" sz="2600" b="1" dirty="0" err="1">
                 <a:solidFill>
                   <a:schemeClr val="bg1"/>
                 </a:solidFill>
@@ -10413,7 +10413,7 @@
               <a:t>роботи</a:t>
             </a:r>
             <a:r>
-              <a:rPr lang="ru-RU" sz="2800" b="1" dirty="0">
+              <a:rPr lang="ru-RU" sz="2600" b="1" dirty="0">
                 <a:solidFill>
                   <a:schemeClr val="bg1"/>
                 </a:solidFill>
@@ -10421,7 +10421,7 @@
               <a:t> з </a:t>
             </a:r>
             <a:r>
-              <a:rPr lang="ru-RU" sz="2800" b="1" dirty="0" err="1">
+              <a:rPr lang="ru-RU" sz="2600" b="1" dirty="0" err="1">
                 <a:solidFill>
                   <a:schemeClr val="bg1"/>
                 </a:solidFill>
@@ -10429,7 +10429,7 @@
               <a:t>Git</a:t>
             </a:r>
             <a:r>
-              <a:rPr lang="ru-RU" sz="2800" b="1" dirty="0">
+              <a:rPr lang="ru-RU" sz="2600" b="1" dirty="0">
                 <a:solidFill>
                   <a:schemeClr val="bg1"/>
                 </a:solidFill>
@@ -10437,7 +10437,7 @@
               <a:t>. </a:t>
             </a:r>
             <a:r>
-              <a:rPr lang="ru-RU" sz="2800" b="1" dirty="0" err="1">
+              <a:rPr lang="ru-RU" sz="2600" b="1" dirty="0" err="1">
                 <a:solidFill>
                   <a:schemeClr val="bg1"/>
                 </a:solidFill>
@@ -10445,7 +10445,7 @@
               <a:t>Базові</a:t>
             </a:r>
             <a:r>
-              <a:rPr lang="ru-RU" sz="2800" b="1" dirty="0">
+              <a:rPr lang="ru-RU" sz="2600" b="1" dirty="0">
                 <a:solidFill>
                   <a:schemeClr val="bg1"/>
                 </a:solidFill>
@@ -10453,7 +10453,7 @@
               <a:t> </a:t>
             </a:r>
             <a:r>
-              <a:rPr lang="ru-RU" sz="2800" b="1" dirty="0" err="1">
+              <a:rPr lang="ru-RU" sz="2600" b="1" dirty="0" err="1">
                 <a:solidFill>
                   <a:schemeClr val="bg1"/>
                 </a:solidFill>
@@ -10461,7 +10461,7 @@
               <a:t>команди</a:t>
             </a:r>
             <a:r>
-              <a:rPr lang="en-US" sz="2800" b="1" dirty="0">
+              <a:rPr lang="en-US" sz="2600" b="1" dirty="0">
                 <a:solidFill>
                   <a:schemeClr val="bg1"/>
                 </a:solidFill>
@@ -10469,7 +10469,7 @@
               <a:t> </a:t>
             </a:r>
             <a:r>
-              <a:rPr lang="en-US" sz="2800" dirty="0">
+              <a:rPr lang="en-US" sz="2600" dirty="0">
                 <a:hlinkClick r:id="rId4">
                   <a:extLst>
                     <a:ext uri="{A12FA001-AC4F-418D-AE19-62706E023703}">
@@ -10480,19 +10480,103 @@
               </a:rPr>
               <a:t>https://hyperhost.ua/info/uk/osnovi-roboti-z-git-bazovi-komandi?gad_source=1&amp;gclid=CjwKCAjwufq2BhAmEiwAnZqw8tYQJKMQT0BP_MPScCsc10IBE1Mg7cM9Duv_4mapN1SWfFfBEnHilhoC_XMQAvD_BwE</a:t>
             </a:r>
-            <a:endParaRPr lang="ru-RU" sz="2800" b="1" dirty="0">
+            <a:endParaRPr lang="ru-RU" sz="2600" b="1" dirty="0">
               <a:solidFill>
                 <a:schemeClr val="bg1"/>
               </a:solidFill>
             </a:endParaRPr>
           </a:p>
           <a:p>
-            <a:pPr marL="342900" lvl="0" indent="-342900">
+            <a:pPr marL="342900" indent="-342900">
               <a:buClrTx/>
               <a:buFont typeface="+mj-lt"/>
               <a:buAutoNum type="arabicPeriod"/>
             </a:pPr>
-            <a:endParaRPr lang="en-US" sz="3600" dirty="0">
+            <a:r>
+              <a:rPr lang="ru-RU" sz="2600" b="1" dirty="0" err="1">
+                <a:solidFill>
+                  <a:schemeClr val="bg1"/>
+                </a:solidFill>
+              </a:rPr>
+              <a:t>Основи</a:t>
+            </a:r>
+            <a:r>
+              <a:rPr lang="ru-RU" sz="2600" b="1" dirty="0">
+                <a:solidFill>
+                  <a:schemeClr val="bg1"/>
+                </a:solidFill>
+              </a:rPr>
+              <a:t> </a:t>
+            </a:r>
+            <a:r>
+              <a:rPr lang="ru-RU" sz="2600" b="1" dirty="0" err="1">
+                <a:solidFill>
+                  <a:schemeClr val="bg1"/>
+                </a:solidFill>
+              </a:rPr>
+              <a:t>роботи</a:t>
+            </a:r>
+            <a:r>
+              <a:rPr lang="ru-RU" sz="2600" b="1" dirty="0">
+                <a:solidFill>
+                  <a:schemeClr val="bg1"/>
+                </a:solidFill>
+              </a:rPr>
+              <a:t> з </a:t>
+            </a:r>
+            <a:r>
+              <a:rPr lang="ru-RU" sz="2600" b="1" dirty="0" err="1">
+                <a:solidFill>
+                  <a:schemeClr val="bg1"/>
+                </a:solidFill>
+              </a:rPr>
+              <a:t>GitHub</a:t>
+            </a:r>
+            <a:r>
+              <a:rPr lang="ru-RU" sz="2600" b="1" dirty="0">
+                <a:solidFill>
+                  <a:schemeClr val="bg1"/>
+                </a:solidFill>
+              </a:rPr>
+              <a:t> для </a:t>
+            </a:r>
+            <a:r>
+              <a:rPr lang="ru-RU" sz="2600" b="1" dirty="0" err="1">
+                <a:solidFill>
+                  <a:schemeClr val="bg1"/>
+                </a:solidFill>
+              </a:rPr>
+              <a:t>Unity</a:t>
+            </a:r>
+            <a:r>
+              <a:rPr lang="en-US" sz="2600" b="1" dirty="0">
+                <a:solidFill>
+                  <a:schemeClr val="bg1"/>
+                </a:solidFill>
+              </a:rPr>
+              <a:t> </a:t>
+            </a:r>
+            <a:r>
+              <a:rPr lang="en-US" sz="2600" dirty="0">
+                <a:hlinkClick r:id="rId5">
+                  <a:extLst>
+                    <a:ext uri="{A12FA001-AC4F-418D-AE19-62706E023703}">
+                      <ahyp:hlinkClr xmlns:ahyp="http://schemas.microsoft.com/office/drawing/2018/hyperlinkcolor" val="tx"/>
+                    </a:ext>
+                  </a:extLst>
+                </a:hlinkClick>
+              </a:rPr>
+              <a:t>https://youtu.be/z6GM_qb-sUY?si=gne1JKl9cuwDngn6</a:t>
+            </a:r>
+            <a:endParaRPr lang="en-US" sz="2600" dirty="0"/>
+          </a:p>
+          <a:p>
+            <a:pPr marL="342900" indent="-342900">
+              <a:buClrTx/>
+              <a:buFont typeface="+mj-lt"/>
+              <a:buAutoNum type="arabicPeriod"/>
+            </a:pPr>
+            <a:endParaRPr lang="ru-RU" sz="2400" b="1" dirty="0">
               <a:solidFill>
                 <a:schemeClr val="bg1"/>
               </a:solidFill>
@@ -10796,65 +10880,10 @@
             </a:r>
           </a:p>
           <a:p>
-            <a:pPr>
+            <a:pPr marL="0" indent="0">
               <a:buClrTx/>
+              <a:buNone/>
             </a:pPr>
-            <a:r>
-              <a:rPr lang="ru-RU" sz="2800" dirty="0">
-                <a:solidFill>
-                  <a:schemeClr val="bg1"/>
-                </a:solidFill>
-              </a:rPr>
-              <a:t> </a:t>
-            </a:r>
-            <a:r>
-              <a:rPr lang="ru-RU" sz="2800" dirty="0" err="1">
-                <a:solidFill>
-                  <a:schemeClr val="bg1"/>
-                </a:solidFill>
-              </a:rPr>
-              <a:t>Встановити</a:t>
-            </a:r>
-            <a:r>
-              <a:rPr lang="ru-RU" sz="2800" dirty="0">
-                <a:solidFill>
-                  <a:schemeClr val="bg1"/>
-                </a:solidFill>
-              </a:rPr>
-              <a:t> </a:t>
-            </a:r>
-            <a:r>
-              <a:rPr lang="en-US" sz="2800" dirty="0">
-                <a:solidFill>
-                  <a:schemeClr val="bg1"/>
-                </a:solidFill>
-              </a:rPr>
-              <a:t>Visual Studio Code – </a:t>
-            </a:r>
-            <a:r>
-              <a:rPr lang="uk-UA" sz="2800" dirty="0">
-                <a:solidFill>
-                  <a:schemeClr val="bg1"/>
-                </a:solidFill>
-              </a:rPr>
-              <a:t>де </a:t>
-            </a:r>
-            <a:r>
-              <a:rPr lang="en-US" sz="2800" dirty="0">
-                <a:solidFill>
-                  <a:schemeClr val="bg1"/>
-                </a:solidFill>
-              </a:rPr>
-              <a:t>Git</a:t>
-            </a:r>
-            <a:r>
-              <a:rPr lang="uk-UA" sz="2800" dirty="0">
-                <a:solidFill>
-                  <a:schemeClr val="bg1"/>
-                </a:solidFill>
-              </a:rPr>
-              <a:t> уже інтегровано у редактор</a:t>
-            </a:r>
             <a:endParaRPr lang="en-US" sz="2800" dirty="0">
               <a:solidFill>
                 <a:schemeClr val="bg1"/>

</xml_diff>